<commit_message>
Slightly less rough draft
</commit_message>
<xml_diff>
--- a/IntroToCPlusPlusGameDev.pptx
+++ b/IntroToCPlusPlusGameDev.pptx
@@ -5,16 +5,17 @@
     <p:sldMasterId id="2147483648" r:id="rId1"/>
   </p:sldMasterIdLst>
   <p:notesMasterIdLst>
-    <p:notesMasterId r:id="rId9"/>
+    <p:notesMasterId r:id="rId10"/>
   </p:notesMasterIdLst>
   <p:sldIdLst>
     <p:sldId id="256" r:id="rId2"/>
     <p:sldId id="257" r:id="rId3"/>
     <p:sldId id="259" r:id="rId4"/>
-    <p:sldId id="258" r:id="rId5"/>
-    <p:sldId id="261" r:id="rId6"/>
-    <p:sldId id="260" r:id="rId7"/>
-    <p:sldId id="262" r:id="rId8"/>
+    <p:sldId id="261" r:id="rId5"/>
+    <p:sldId id="260" r:id="rId6"/>
+    <p:sldId id="263" r:id="rId7"/>
+    <p:sldId id="258" r:id="rId8"/>
+    <p:sldId id="262" r:id="rId9"/>
   </p:sldIdLst>
   <p:sldSz cx="12192000" cy="6858000"/>
   <p:notesSz cx="6858000" cy="9144000"/>
@@ -113,17 +114,18 @@
       </a:defRPr>
     </a:lvl9pPr>
   </p:defaultTextStyle>
+  <p:extLst>
+    <p:ext uri="{EFAFB233-063F-42B5-8137-9DF3F51BA10A}">
+      <p15:sldGuideLst xmlns:p15="http://schemas.microsoft.com/office/powerpoint/2012/main"/>
+    </p:ext>
+  </p:extLst>
 </p:presentation>
 </file>
 
 <file path=ppt/commentAuthors.xml><?xml version="1.0" encoding="utf-8"?>
 <p:cmAuthorLst xmlns:a="http://schemas.openxmlformats.org/drawingml/2006/main" xmlns:r="http://schemas.openxmlformats.org/officeDocument/2006/relationships" xmlns:p="http://schemas.openxmlformats.org/presentationml/2006/main">
   <p:cmAuthor id="1" name="Stephen Gowen" initials="SG" lastIdx="1" clrIdx="0">
-    <p:extLst>
-      <p:ext uri="{19B8F6BF-5375-455C-9EA6-DF929625EA0E}">
-        <p15:presenceInfo xmlns:p15="http://schemas.microsoft.com/office/powerpoint/2012/main" userId="" providerId=""/>
-      </p:ext>
-    </p:extLst>
+    <p:extLst/>
   </p:cmAuthor>
 </p:cmAuthorLst>
 </file>
@@ -210,7 +212,7 @@
           <a:p>
             <a:fld id="{6BC255D4-D124-9542-92F9-7095C27B7ECE}" type="datetimeFigureOut">
               <a:rPr lang="en-US" smtClean="0"/>
-              <a:t>4/30/17</a:t>
+              <a:t>5/1/17</a:t>
             </a:fld>
             <a:endParaRPr lang="en-US"/>
           </a:p>
@@ -627,7 +629,7 @@
           <a:p>
             <a:fld id="{D7CB6F53-0868-6740-8225-8833E0358A78}" type="slidenum">
               <a:rPr lang="en-US" smtClean="0"/>
-              <a:t>6</a:t>
+              <a:t>5</a:t>
             </a:fld>
             <a:endParaRPr lang="en-US"/>
           </a:p>
@@ -777,7 +779,7 @@
           <a:p>
             <a:fld id="{1951D928-8AAE-F545-87DE-A0C9E2AF6744}" type="datetimeFigureOut">
               <a:rPr lang="en-US" smtClean="0"/>
-              <a:t>4/30/17</a:t>
+              <a:t>5/1/17</a:t>
             </a:fld>
             <a:endParaRPr lang="en-US"/>
           </a:p>
@@ -947,7 +949,7 @@
           <a:p>
             <a:fld id="{1951D928-8AAE-F545-87DE-A0C9E2AF6744}" type="datetimeFigureOut">
               <a:rPr lang="en-US" smtClean="0"/>
-              <a:t>4/30/17</a:t>
+              <a:t>5/1/17</a:t>
             </a:fld>
             <a:endParaRPr lang="en-US"/>
           </a:p>
@@ -1127,7 +1129,7 @@
           <a:p>
             <a:fld id="{1951D928-8AAE-F545-87DE-A0C9E2AF6744}" type="datetimeFigureOut">
               <a:rPr lang="en-US" smtClean="0"/>
-              <a:t>4/30/17</a:t>
+              <a:t>5/1/17</a:t>
             </a:fld>
             <a:endParaRPr lang="en-US"/>
           </a:p>
@@ -1297,7 +1299,7 @@
           <a:p>
             <a:fld id="{1951D928-8AAE-F545-87DE-A0C9E2AF6744}" type="datetimeFigureOut">
               <a:rPr lang="en-US" smtClean="0"/>
-              <a:t>4/30/17</a:t>
+              <a:t>5/1/17</a:t>
             </a:fld>
             <a:endParaRPr lang="en-US"/>
           </a:p>
@@ -1543,7 +1545,7 @@
           <a:p>
             <a:fld id="{1951D928-8AAE-F545-87DE-A0C9E2AF6744}" type="datetimeFigureOut">
               <a:rPr lang="en-US" smtClean="0"/>
-              <a:t>4/30/17</a:t>
+              <a:t>5/1/17</a:t>
             </a:fld>
             <a:endParaRPr lang="en-US"/>
           </a:p>
@@ -1775,7 +1777,7 @@
           <a:p>
             <a:fld id="{1951D928-8AAE-F545-87DE-A0C9E2AF6744}" type="datetimeFigureOut">
               <a:rPr lang="en-US" smtClean="0"/>
-              <a:t>4/30/17</a:t>
+              <a:t>5/1/17</a:t>
             </a:fld>
             <a:endParaRPr lang="en-US"/>
           </a:p>
@@ -2142,7 +2144,7 @@
           <a:p>
             <a:fld id="{1951D928-8AAE-F545-87DE-A0C9E2AF6744}" type="datetimeFigureOut">
               <a:rPr lang="en-US" smtClean="0"/>
-              <a:t>4/30/17</a:t>
+              <a:t>5/1/17</a:t>
             </a:fld>
             <a:endParaRPr lang="en-US"/>
           </a:p>
@@ -2260,7 +2262,7 @@
           <a:p>
             <a:fld id="{1951D928-8AAE-F545-87DE-A0C9E2AF6744}" type="datetimeFigureOut">
               <a:rPr lang="en-US" smtClean="0"/>
-              <a:t>4/30/17</a:t>
+              <a:t>5/1/17</a:t>
             </a:fld>
             <a:endParaRPr lang="en-US"/>
           </a:p>
@@ -2355,7 +2357,7 @@
           <a:p>
             <a:fld id="{1951D928-8AAE-F545-87DE-A0C9E2AF6744}" type="datetimeFigureOut">
               <a:rPr lang="en-US" smtClean="0"/>
-              <a:t>4/30/17</a:t>
+              <a:t>5/1/17</a:t>
             </a:fld>
             <a:endParaRPr lang="en-US"/>
           </a:p>
@@ -2632,7 +2634,7 @@
           <a:p>
             <a:fld id="{1951D928-8AAE-F545-87DE-A0C9E2AF6744}" type="datetimeFigureOut">
               <a:rPr lang="en-US" smtClean="0"/>
-              <a:t>4/30/17</a:t>
+              <a:t>5/1/17</a:t>
             </a:fld>
             <a:endParaRPr lang="en-US"/>
           </a:p>
@@ -2885,7 +2887,7 @@
           <a:p>
             <a:fld id="{1951D928-8AAE-F545-87DE-A0C9E2AF6744}" type="datetimeFigureOut">
               <a:rPr lang="en-US" smtClean="0"/>
-              <a:t>4/30/17</a:t>
+              <a:t>5/1/17</a:t>
             </a:fld>
             <a:endParaRPr lang="en-US"/>
           </a:p>
@@ -3098,7 +3100,7 @@
           <a:p>
             <a:fld id="{1951D928-8AAE-F545-87DE-A0C9E2AF6744}" type="datetimeFigureOut">
               <a:rPr lang="en-US" smtClean="0"/>
-              <a:t>4/30/17</a:t>
+              <a:t>5/1/17</a:t>
             </a:fld>
             <a:endParaRPr lang="en-US"/>
           </a:p>
@@ -3629,16 +3631,12 @@
               <a:t>A programming </a:t>
             </a:r>
             <a:r>
-              <a:rPr lang="en-US" dirty="0" err="1"/>
-              <a:t>l</a:t>
-            </a:r>
-            <a:r>
-              <a:rPr lang="en-US" dirty="0" err="1" smtClean="0"/>
-              <a:t>anuage</a:t>
-            </a:r>
-            <a:r>
-              <a:rPr lang="en-US" dirty="0" smtClean="0"/>
-              <a:t> created by Bjarne </a:t>
+              <a:rPr lang="en-US" dirty="0" smtClean="0"/>
+              <a:t>language </a:t>
+            </a:r>
+            <a:r>
+              <a:rPr lang="en-US" dirty="0" smtClean="0"/>
+              <a:t>created by Bjarne </a:t>
             </a:r>
             <a:r>
               <a:rPr lang="en-US" dirty="0" err="1" smtClean="0"/>
@@ -3875,7 +3873,6 @@
               <a:rPr lang="en-US" dirty="0" smtClean="0"/>
               <a:t>Shadow Puppeteer</a:t>
             </a:r>
-            <a:endParaRPr lang="en-US" dirty="0" smtClean="0"/>
           </a:p>
           <a:p>
             <a:r>
@@ -3957,7 +3954,15 @@
           <a:p>
             <a:r>
               <a:rPr lang="en-US" dirty="0" smtClean="0"/>
-              <a:t>Game Dev Time!</a:t>
+              <a:t>C++ </a:t>
+            </a:r>
+            <a:r>
+              <a:rPr lang="en-US" dirty="0" smtClean="0"/>
+              <a:t>Crash Course Part </a:t>
+            </a:r>
+            <a:r>
+              <a:rPr lang="en-US" dirty="0" smtClean="0"/>
+              <a:t>I</a:t>
             </a:r>
             <a:endParaRPr lang="en-US" dirty="0"/>
           </a:p>
@@ -3975,79 +3980,171 @@
         </p:nvSpPr>
         <p:spPr/>
         <p:txBody>
-          <a:bodyPr>
-            <a:normAutofit/>
-          </a:bodyPr>
-          <a:lstStyle/>
-          <a:p>
-            <a:r>
-              <a:rPr lang="en-US" dirty="0" smtClean="0"/>
-              <a:t>We are going to be developing the classic Snake game</a:t>
-            </a:r>
-          </a:p>
-          <a:p>
-            <a:r>
-              <a:rPr lang="en-US" dirty="0" smtClean="0"/>
-              <a:t>Game Design Goals:</a:t>
+          <a:bodyPr/>
+          <a:lstStyle/>
+          <a:p>
+            <a:r>
+              <a:rPr lang="en-US" dirty="0" smtClean="0"/>
+              <a:t>Data is stored into a variable with a type, here are some examples:</a:t>
             </a:r>
           </a:p>
           <a:p>
             <a:pPr lvl="1"/>
             <a:r>
               <a:rPr lang="en-US" dirty="0" smtClean="0"/>
-              <a:t>Must keep track of score</a:t>
+              <a:t>Numbers - bool, </a:t>
+            </a:r>
+            <a:r>
+              <a:rPr lang="en-US" dirty="0" err="1" smtClean="0"/>
+              <a:t>int</a:t>
+            </a:r>
+            <a:r>
+              <a:rPr lang="en-US" dirty="0" smtClean="0"/>
+              <a:t>, double, float</a:t>
             </a:r>
           </a:p>
           <a:p>
             <a:pPr lvl="1"/>
             <a:r>
               <a:rPr lang="en-US" dirty="0" smtClean="0"/>
-              <a:t>Must be easy to control</a:t>
-            </a:r>
-          </a:p>
-          <a:p>
-            <a:pPr lvl="1"/>
-            <a:r>
-              <a:rPr lang="en-US" dirty="0" smtClean="0"/>
-              <a:t>Must have “game over” conditions, so there is an actual challenge</a:t>
-            </a:r>
-          </a:p>
-          <a:p>
-            <a:pPr lvl="1"/>
-            <a:r>
-              <a:rPr lang="en-US" dirty="0" smtClean="0"/>
-              <a:t>Must not contain any bugs!</a:t>
-            </a:r>
-          </a:p>
-          <a:p>
-            <a:r>
-              <a:rPr lang="en-US" dirty="0" smtClean="0"/>
-              <a:t>If you want to follow along, go to this URL on your laptop: </a:t>
-            </a:r>
-            <a:r>
-              <a:rPr lang="en-US" dirty="0" smtClean="0">
-                <a:hlinkClick r:id="rId2"/>
-              </a:rPr>
-              <a:t>https://goo.gl/av9564</a:t>
-            </a:r>
+              <a:t>Text - char, string</a:t>
+            </a:r>
+          </a:p>
+          <a:p>
+            <a:r>
+              <a:rPr lang="en-US" dirty="0" smtClean="0"/>
+              <a:t>Code can be placed into if blocks, for loops, and while loops:</a:t>
+            </a:r>
+          </a:p>
+          <a:p>
             <a:endParaRPr lang="en-US" dirty="0" smtClean="0"/>
           </a:p>
-          <a:p>
-            <a:r>
-              <a:rPr lang="en-US" dirty="0" smtClean="0"/>
-              <a:t>Or if you’re feeling frisky, compile the code yourself! NOTE: this means you need a compiler!</a:t>
-            </a:r>
-            <a:endParaRPr lang="en-US" dirty="0" smtClean="0"/>
-          </a:p>
-          <a:p>
-            <a:endParaRPr lang="en-US" dirty="0" smtClean="0"/>
-          </a:p>
-        </p:txBody>
-      </p:sp>
+        </p:txBody>
+      </p:sp>
+      <p:pic>
+        <p:nvPicPr>
+          <p:cNvPr id="9" name="Picture 8"/>
+          <p:cNvPicPr>
+            <a:picLocks noChangeAspect="1"/>
+          </p:cNvPicPr>
+          <p:nvPr/>
+        </p:nvPicPr>
+        <p:blipFill>
+          <a:blip r:embed="rId2">
+            <a:extLst>
+              <a:ext uri="{28A0092B-C50C-407E-A947-70E740481C1C}">
+                <a14:useLocalDpi xmlns:a14="http://schemas.microsoft.com/office/drawing/2010/main" val="0"/>
+              </a:ext>
+            </a:extLst>
+          </a:blip>
+          <a:stretch>
+            <a:fillRect/>
+          </a:stretch>
+        </p:blipFill>
+        <p:spPr>
+          <a:xfrm>
+            <a:off x="838200" y="3809646"/>
+            <a:ext cx="4165600" cy="2768600"/>
+          </a:xfrm>
+          <a:prstGeom prst="rect">
+            <a:avLst/>
+          </a:prstGeom>
+        </p:spPr>
+      </p:pic>
+      <p:pic>
+        <p:nvPicPr>
+          <p:cNvPr id="12" name="Picture 11"/>
+          <p:cNvPicPr>
+            <a:picLocks noChangeAspect="1"/>
+          </p:cNvPicPr>
+          <p:nvPr/>
+        </p:nvPicPr>
+        <p:blipFill>
+          <a:blip r:embed="rId3">
+            <a:extLst>
+              <a:ext uri="{28A0092B-C50C-407E-A947-70E740481C1C}">
+                <a14:useLocalDpi xmlns:a14="http://schemas.microsoft.com/office/drawing/2010/main" val="0"/>
+              </a:ext>
+            </a:extLst>
+          </a:blip>
+          <a:stretch>
+            <a:fillRect/>
+          </a:stretch>
+        </p:blipFill>
+        <p:spPr>
+          <a:xfrm>
+            <a:off x="6199037" y="4927246"/>
+            <a:ext cx="3543300" cy="1651000"/>
+          </a:xfrm>
+          <a:prstGeom prst="rect">
+            <a:avLst/>
+          </a:prstGeom>
+        </p:spPr>
+      </p:pic>
+      <p:pic>
+        <p:nvPicPr>
+          <p:cNvPr id="5" name="Picture 4"/>
+          <p:cNvPicPr>
+            <a:picLocks noChangeAspect="1"/>
+          </p:cNvPicPr>
+          <p:nvPr/>
+        </p:nvPicPr>
+        <p:blipFill>
+          <a:blip r:embed="rId4">
+            <a:extLst>
+              <a:ext uri="{28A0092B-C50C-407E-A947-70E740481C1C}">
+                <a14:useLocalDpi xmlns:a14="http://schemas.microsoft.com/office/drawing/2010/main" val="0"/>
+              </a:ext>
+            </a:extLst>
+          </a:blip>
+          <a:stretch>
+            <a:fillRect/>
+          </a:stretch>
+        </p:blipFill>
+        <p:spPr>
+          <a:xfrm>
+            <a:off x="6427637" y="2395538"/>
+            <a:ext cx="3086100" cy="609600"/>
+          </a:xfrm>
+          <a:prstGeom prst="rect">
+            <a:avLst/>
+          </a:prstGeom>
+        </p:spPr>
+      </p:pic>
+      <p:pic>
+        <p:nvPicPr>
+          <p:cNvPr id="6" name="Picture 5"/>
+          <p:cNvPicPr>
+            <a:picLocks noChangeAspect="1"/>
+          </p:cNvPicPr>
+          <p:nvPr/>
+        </p:nvPicPr>
+        <p:blipFill>
+          <a:blip r:embed="rId5">
+            <a:extLst>
+              <a:ext uri="{28A0092B-C50C-407E-A947-70E740481C1C}">
+                <a14:useLocalDpi xmlns:a14="http://schemas.microsoft.com/office/drawing/2010/main" val="0"/>
+              </a:ext>
+            </a:extLst>
+          </a:blip>
+          <a:stretch>
+            <a:fillRect/>
+          </a:stretch>
+        </p:blipFill>
+        <p:spPr>
+          <a:xfrm>
+            <a:off x="5538637" y="3725510"/>
+            <a:ext cx="4864100" cy="1143000"/>
+          </a:xfrm>
+          <a:prstGeom prst="rect">
+            <a:avLst/>
+          </a:prstGeom>
+        </p:spPr>
+      </p:pic>
     </p:spTree>
     <p:extLst>
       <p:ext uri="{BB962C8B-B14F-4D97-AF65-F5344CB8AC3E}">
-        <p14:creationId xmlns:p14="http://schemas.microsoft.com/office/powerpoint/2010/main" val="175421262"/>
+        <p14:creationId xmlns:p14="http://schemas.microsoft.com/office/powerpoint/2010/main" val="2105096159"/>
       </p:ext>
     </p:extLst>
   </p:cSld>
@@ -4091,234 +4188,15 @@
           <a:p>
             <a:r>
               <a:rPr lang="en-US" dirty="0" smtClean="0"/>
-              <a:t>C++ Primer Part I</a:t>
-            </a:r>
-            <a:endParaRPr lang="en-US" dirty="0"/>
-          </a:p>
-        </p:txBody>
-      </p:sp>
-      <p:sp>
-        <p:nvSpPr>
-          <p:cNvPr id="3" name="Content Placeholder 2"/>
-          <p:cNvSpPr>
-            <a:spLocks noGrp="1"/>
-          </p:cNvSpPr>
-          <p:nvPr>
-            <p:ph idx="1"/>
-          </p:nvPr>
-        </p:nvSpPr>
-        <p:spPr/>
-        <p:txBody>
-          <a:bodyPr/>
-          <a:lstStyle/>
-          <a:p>
-            <a:r>
-              <a:rPr lang="en-US" dirty="0" smtClean="0"/>
-              <a:t>Data is stored into a variable with a type, here are some examples:</a:t>
-            </a:r>
-          </a:p>
-          <a:p>
-            <a:pPr lvl="1"/>
-            <a:r>
-              <a:rPr lang="en-US" dirty="0" smtClean="0"/>
-              <a:t>Numbers - bool, </a:t>
-            </a:r>
-            <a:r>
-              <a:rPr lang="en-US" dirty="0" err="1" smtClean="0"/>
-              <a:t>int</a:t>
-            </a:r>
-            <a:r>
-              <a:rPr lang="en-US" dirty="0" smtClean="0"/>
-              <a:t>, double, float</a:t>
-            </a:r>
-          </a:p>
-          <a:p>
-            <a:pPr lvl="1"/>
-            <a:r>
-              <a:rPr lang="en-US" dirty="0" smtClean="0"/>
-              <a:t>Text - char, string</a:t>
-            </a:r>
-            <a:endParaRPr lang="en-US" dirty="0" smtClean="0"/>
-          </a:p>
-          <a:p>
-            <a:r>
-              <a:rPr lang="en-US" dirty="0" smtClean="0"/>
-              <a:t>Code can be placed into if blocks, for loops, and while loops:</a:t>
-            </a:r>
-          </a:p>
-          <a:p>
-            <a:endParaRPr lang="en-US" dirty="0" smtClean="0"/>
-          </a:p>
-        </p:txBody>
-      </p:sp>
-      <p:pic>
-        <p:nvPicPr>
-          <p:cNvPr id="4" name="Picture 3"/>
-          <p:cNvPicPr>
-            <a:picLocks noChangeAspect="1"/>
-          </p:cNvPicPr>
-          <p:nvPr/>
-        </p:nvPicPr>
-        <p:blipFill>
-          <a:blip r:embed="rId2">
-            <a:extLst>
-              <a:ext uri="{28A0092B-C50C-407E-A947-70E740481C1C}">
-                <a14:useLocalDpi xmlns:a14="http://schemas.microsoft.com/office/drawing/2010/main" val="0"/>
-              </a:ext>
-            </a:extLst>
-          </a:blip>
-          <a:stretch>
-            <a:fillRect/>
-          </a:stretch>
-        </p:blipFill>
-        <p:spPr>
-          <a:xfrm>
-            <a:off x="6840387" y="2303109"/>
-            <a:ext cx="2260600" cy="863600"/>
-          </a:xfrm>
-          <a:prstGeom prst="rect">
-            <a:avLst/>
-          </a:prstGeom>
-        </p:spPr>
-      </p:pic>
-      <p:pic>
-        <p:nvPicPr>
-          <p:cNvPr id="9" name="Picture 8"/>
-          <p:cNvPicPr>
-            <a:picLocks noChangeAspect="1"/>
-          </p:cNvPicPr>
-          <p:nvPr/>
-        </p:nvPicPr>
-        <p:blipFill>
-          <a:blip r:embed="rId3">
-            <a:extLst>
-              <a:ext uri="{28A0092B-C50C-407E-A947-70E740481C1C}">
-                <a14:useLocalDpi xmlns:a14="http://schemas.microsoft.com/office/drawing/2010/main" val="0"/>
-              </a:ext>
-            </a:extLst>
-          </a:blip>
-          <a:stretch>
-            <a:fillRect/>
-          </a:stretch>
-        </p:blipFill>
-        <p:spPr>
-          <a:xfrm>
-            <a:off x="838200" y="3809646"/>
-            <a:ext cx="4165600" cy="2768600"/>
-          </a:xfrm>
-          <a:prstGeom prst="rect">
-            <a:avLst/>
-          </a:prstGeom>
-        </p:spPr>
-      </p:pic>
-      <p:pic>
-        <p:nvPicPr>
-          <p:cNvPr id="11" name="Picture 10"/>
-          <p:cNvPicPr>
-            <a:picLocks noChangeAspect="1"/>
-          </p:cNvPicPr>
-          <p:nvPr/>
-        </p:nvPicPr>
-        <p:blipFill>
-          <a:blip r:embed="rId4">
-            <a:extLst>
-              <a:ext uri="{28A0092B-C50C-407E-A947-70E740481C1C}">
-                <a14:useLocalDpi xmlns:a14="http://schemas.microsoft.com/office/drawing/2010/main" val="0"/>
-              </a:ext>
-            </a:extLst>
-          </a:blip>
-          <a:stretch>
-            <a:fillRect/>
-          </a:stretch>
-        </p:blipFill>
-        <p:spPr>
-          <a:xfrm>
-            <a:off x="5544987" y="3809646"/>
-            <a:ext cx="4851400" cy="1130300"/>
-          </a:xfrm>
-          <a:prstGeom prst="rect">
-            <a:avLst/>
-          </a:prstGeom>
-        </p:spPr>
-      </p:pic>
-      <p:pic>
-        <p:nvPicPr>
-          <p:cNvPr id="12" name="Picture 11"/>
-          <p:cNvPicPr>
-            <a:picLocks noChangeAspect="1"/>
-          </p:cNvPicPr>
-          <p:nvPr/>
-        </p:nvPicPr>
-        <p:blipFill>
-          <a:blip r:embed="rId5">
-            <a:extLst>
-              <a:ext uri="{28A0092B-C50C-407E-A947-70E740481C1C}">
-                <a14:useLocalDpi xmlns:a14="http://schemas.microsoft.com/office/drawing/2010/main" val="0"/>
-              </a:ext>
-            </a:extLst>
-          </a:blip>
-          <a:stretch>
-            <a:fillRect/>
-          </a:stretch>
-        </p:blipFill>
-        <p:spPr>
-          <a:xfrm>
-            <a:off x="6199037" y="5003447"/>
-            <a:ext cx="3543300" cy="1651000"/>
-          </a:xfrm>
-          <a:prstGeom prst="rect">
-            <a:avLst/>
-          </a:prstGeom>
-        </p:spPr>
-      </p:pic>
-    </p:spTree>
-    <p:extLst>
-      <p:ext uri="{BB962C8B-B14F-4D97-AF65-F5344CB8AC3E}">
-        <p14:creationId xmlns:p14="http://schemas.microsoft.com/office/powerpoint/2010/main" val="2105096159"/>
-      </p:ext>
-    </p:extLst>
-  </p:cSld>
-  <p:clrMapOvr>
-    <a:masterClrMapping/>
-  </p:clrMapOvr>
-</p:sld>
-</file>
-
-<file path=ppt/slides/slide6.xml><?xml version="1.0" encoding="utf-8"?>
-<p:sld xmlns:a="http://schemas.openxmlformats.org/drawingml/2006/main" xmlns:r="http://schemas.openxmlformats.org/officeDocument/2006/relationships" xmlns:p="http://schemas.openxmlformats.org/presentationml/2006/main">
-  <p:cSld>
-    <p:spTree>
-      <p:nvGrpSpPr>
-        <p:cNvPr id="1" name=""/>
-        <p:cNvGrpSpPr/>
-        <p:nvPr/>
-      </p:nvGrpSpPr>
-      <p:grpSpPr>
-        <a:xfrm>
-          <a:off x="0" y="0"/>
-          <a:ext cx="0" cy="0"/>
-          <a:chOff x="0" y="0"/>
-          <a:chExt cx="0" cy="0"/>
-        </a:xfrm>
-      </p:grpSpPr>
-      <p:sp>
-        <p:nvSpPr>
-          <p:cNvPr id="2" name="Title 1"/>
-          <p:cNvSpPr>
-            <a:spLocks noGrp="1"/>
-          </p:cNvSpPr>
-          <p:nvPr>
-            <p:ph type="title"/>
-          </p:nvPr>
-        </p:nvSpPr>
-        <p:spPr/>
-        <p:txBody>
-          <a:bodyPr/>
-          <a:lstStyle/>
-          <a:p>
-            <a:r>
-              <a:rPr lang="en-US" dirty="0" smtClean="0"/>
-              <a:t>C++ Primer Part II</a:t>
+              <a:t>C++ </a:t>
+            </a:r>
+            <a:r>
+              <a:rPr lang="en-US" dirty="0" smtClean="0"/>
+              <a:t>Crash Course Part </a:t>
+            </a:r>
+            <a:r>
+              <a:rPr lang="en-US" dirty="0" smtClean="0"/>
+              <a:t>II</a:t>
             </a:r>
             <a:endParaRPr lang="en-US" dirty="0"/>
           </a:p>
@@ -4538,7 +4416,256 @@
 </p:sld>
 </file>
 
+<file path=ppt/slides/slide6.xml><?xml version="1.0" encoding="utf-8"?>
+<p:sld xmlns:a="http://schemas.openxmlformats.org/drawingml/2006/main" xmlns:r="http://schemas.openxmlformats.org/officeDocument/2006/relationships" xmlns:p="http://schemas.openxmlformats.org/presentationml/2006/main">
+  <p:cSld>
+    <p:spTree>
+      <p:nvGrpSpPr>
+        <p:cNvPr id="1" name=""/>
+        <p:cNvGrpSpPr/>
+        <p:nvPr/>
+      </p:nvGrpSpPr>
+      <p:grpSpPr>
+        <a:xfrm>
+          <a:off x="0" y="0"/>
+          <a:ext cx="0" cy="0"/>
+          <a:chOff x="0" y="0"/>
+          <a:chExt cx="0" cy="0"/>
+        </a:xfrm>
+      </p:grpSpPr>
+      <p:sp>
+        <p:nvSpPr>
+          <p:cNvPr id="2" name="Title 1"/>
+          <p:cNvSpPr>
+            <a:spLocks noGrp="1"/>
+          </p:cNvSpPr>
+          <p:nvPr>
+            <p:ph type="title"/>
+          </p:nvPr>
+        </p:nvSpPr>
+        <p:spPr/>
+        <p:txBody>
+          <a:bodyPr/>
+          <a:lstStyle/>
+          <a:p>
+            <a:r>
+              <a:rPr lang="en-US" dirty="0" smtClean="0"/>
+              <a:t>C++ Crash Course Part III</a:t>
+            </a:r>
+            <a:endParaRPr lang="en-US" dirty="0"/>
+          </a:p>
+        </p:txBody>
+      </p:sp>
+      <p:sp>
+        <p:nvSpPr>
+          <p:cNvPr id="3" name="Content Placeholder 2"/>
+          <p:cNvSpPr>
+            <a:spLocks noGrp="1"/>
+          </p:cNvSpPr>
+          <p:nvPr>
+            <p:ph idx="1"/>
+          </p:nvPr>
+        </p:nvSpPr>
+        <p:spPr/>
+        <p:txBody>
+          <a:bodyPr/>
+          <a:lstStyle/>
+          <a:p>
+            <a:r>
+              <a:rPr lang="en-US" dirty="0" smtClean="0"/>
+              <a:t>Okay, let’s see what a basic complete program looks like:</a:t>
+            </a:r>
+            <a:endParaRPr lang="en-US" dirty="0"/>
+          </a:p>
+        </p:txBody>
+      </p:sp>
+      <p:pic>
+        <p:nvPicPr>
+          <p:cNvPr id="5" name="Picture 4"/>
+          <p:cNvPicPr>
+            <a:picLocks noChangeAspect="1"/>
+          </p:cNvPicPr>
+          <p:nvPr/>
+        </p:nvPicPr>
+        <p:blipFill>
+          <a:blip r:embed="rId2">
+            <a:extLst>
+              <a:ext uri="{28A0092B-C50C-407E-A947-70E740481C1C}">
+                <a14:useLocalDpi xmlns:a14="http://schemas.microsoft.com/office/drawing/2010/main" val="0"/>
+              </a:ext>
+            </a:extLst>
+          </a:blip>
+          <a:stretch>
+            <a:fillRect/>
+          </a:stretch>
+        </p:blipFill>
+        <p:spPr>
+          <a:xfrm>
+            <a:off x="2838450" y="2390775"/>
+            <a:ext cx="6515100" cy="4178300"/>
+          </a:xfrm>
+          <a:prstGeom prst="rect">
+            <a:avLst/>
+          </a:prstGeom>
+        </p:spPr>
+      </p:pic>
+    </p:spTree>
+    <p:extLst>
+      <p:ext uri="{BB962C8B-B14F-4D97-AF65-F5344CB8AC3E}">
+        <p14:creationId xmlns:p14="http://schemas.microsoft.com/office/powerpoint/2010/main" val="1570316712"/>
+      </p:ext>
+    </p:extLst>
+  </p:cSld>
+  <p:clrMapOvr>
+    <a:masterClrMapping/>
+  </p:clrMapOvr>
+</p:sld>
+</file>
+
 <file path=ppt/slides/slide7.xml><?xml version="1.0" encoding="utf-8"?>
+<p:sld xmlns:a="http://schemas.openxmlformats.org/drawingml/2006/main" xmlns:r="http://schemas.openxmlformats.org/officeDocument/2006/relationships" xmlns:p="http://schemas.openxmlformats.org/presentationml/2006/main">
+  <p:cSld>
+    <p:spTree>
+      <p:nvGrpSpPr>
+        <p:cNvPr id="1" name=""/>
+        <p:cNvGrpSpPr/>
+        <p:nvPr/>
+      </p:nvGrpSpPr>
+      <p:grpSpPr>
+        <a:xfrm>
+          <a:off x="0" y="0"/>
+          <a:ext cx="0" cy="0"/>
+          <a:chOff x="0" y="0"/>
+          <a:chExt cx="0" cy="0"/>
+        </a:xfrm>
+      </p:grpSpPr>
+      <p:sp>
+        <p:nvSpPr>
+          <p:cNvPr id="2" name="Title 1"/>
+          <p:cNvSpPr>
+            <a:spLocks noGrp="1"/>
+          </p:cNvSpPr>
+          <p:nvPr>
+            <p:ph type="title"/>
+          </p:nvPr>
+        </p:nvSpPr>
+        <p:spPr/>
+        <p:txBody>
+          <a:bodyPr/>
+          <a:lstStyle/>
+          <a:p>
+            <a:r>
+              <a:rPr lang="en-US" dirty="0" smtClean="0"/>
+              <a:t>Game Dev Time!</a:t>
+            </a:r>
+            <a:endParaRPr lang="en-US" dirty="0"/>
+          </a:p>
+        </p:txBody>
+      </p:sp>
+      <p:sp>
+        <p:nvSpPr>
+          <p:cNvPr id="3" name="Content Placeholder 2"/>
+          <p:cNvSpPr>
+            <a:spLocks noGrp="1"/>
+          </p:cNvSpPr>
+          <p:nvPr>
+            <p:ph idx="1"/>
+          </p:nvPr>
+        </p:nvSpPr>
+        <p:spPr/>
+        <p:txBody>
+          <a:bodyPr>
+            <a:normAutofit/>
+          </a:bodyPr>
+          <a:lstStyle/>
+          <a:p>
+            <a:r>
+              <a:rPr lang="en-US" dirty="0" smtClean="0"/>
+              <a:t>We are going to be developing the classic Snake game</a:t>
+            </a:r>
+          </a:p>
+          <a:p>
+            <a:r>
+              <a:rPr lang="en-US" dirty="0" smtClean="0"/>
+              <a:t>Game Design Goals:</a:t>
+            </a:r>
+          </a:p>
+          <a:p>
+            <a:pPr lvl="1"/>
+            <a:r>
+              <a:rPr lang="en-US" dirty="0" smtClean="0"/>
+              <a:t>Must keep track of score</a:t>
+            </a:r>
+          </a:p>
+          <a:p>
+            <a:pPr lvl="1"/>
+            <a:r>
+              <a:rPr lang="en-US" dirty="0" smtClean="0"/>
+              <a:t>Must be easy to control</a:t>
+            </a:r>
+          </a:p>
+          <a:p>
+            <a:pPr lvl="1"/>
+            <a:r>
+              <a:rPr lang="en-US" dirty="0" smtClean="0"/>
+              <a:t>Must have “game over” conditions, so there is an actual challenge</a:t>
+            </a:r>
+          </a:p>
+          <a:p>
+            <a:pPr lvl="1"/>
+            <a:r>
+              <a:rPr lang="en-US" dirty="0" smtClean="0"/>
+              <a:t>Must not contain any bugs!</a:t>
+            </a:r>
+          </a:p>
+          <a:p>
+            <a:r>
+              <a:rPr lang="en-US" dirty="0" smtClean="0"/>
+              <a:t>If you want to follow along, go to this URL on your laptop</a:t>
+            </a:r>
+            <a:r>
+              <a:rPr lang="en-US" dirty="0" smtClean="0"/>
+              <a:t>: </a:t>
+            </a:r>
+            <a:r>
+              <a:rPr lang="en-US" dirty="0">
+                <a:hlinkClick r:id="rId2"/>
+              </a:rPr>
+              <a:t>https://</a:t>
+            </a:r>
+            <a:r>
+              <a:rPr lang="en-US" dirty="0" smtClean="0">
+                <a:hlinkClick r:id="rId2"/>
+              </a:rPr>
+              <a:t>goo.gl/DJj7Qb</a:t>
+            </a:r>
+            <a:endParaRPr lang="en-US" dirty="0" smtClean="0"/>
+          </a:p>
+          <a:p>
+            <a:r>
+              <a:rPr lang="en-US" dirty="0" smtClean="0"/>
+              <a:t>Or if you’re feeling frisky, compile the code yourself! NOTE: this means you need a compiler!</a:t>
+            </a:r>
+          </a:p>
+          <a:p>
+            <a:endParaRPr lang="en-US" dirty="0" smtClean="0"/>
+          </a:p>
+        </p:txBody>
+      </p:sp>
+    </p:spTree>
+    <p:extLst>
+      <p:ext uri="{BB962C8B-B14F-4D97-AF65-F5344CB8AC3E}">
+        <p14:creationId xmlns:p14="http://schemas.microsoft.com/office/powerpoint/2010/main" val="175421262"/>
+      </p:ext>
+    </p:extLst>
+  </p:cSld>
+  <p:clrMapOvr>
+    <a:masterClrMapping/>
+  </p:clrMapOvr>
+</p:sld>
+</file>
+
+<file path=ppt/slides/slide8.xml><?xml version="1.0" encoding="utf-8"?>
 <p:sld xmlns:a="http://schemas.openxmlformats.org/drawingml/2006/main" xmlns:r="http://schemas.openxmlformats.org/officeDocument/2006/relationships" xmlns:p="http://schemas.openxmlformats.org/presentationml/2006/main">
   <p:cSld>
     <p:spTree>

</xml_diff>

<commit_message>
Adding repository link to PP
</commit_message>
<xml_diff>
--- a/IntroToCPlusPlusGameDev.pptx
+++ b/IntroToCPlusPlusGameDev.pptx
@@ -214,7 +214,7 @@
           <a:p>
             <a:fld id="{6BC255D4-D124-9542-92F9-7095C27B7ECE}" type="datetimeFigureOut">
               <a:rPr lang="en-US" smtClean="0"/>
-              <a:t>5/9/17</a:t>
+              <a:t>5/12/17</a:t>
             </a:fld>
             <a:endParaRPr lang="en-US"/>
           </a:p>
@@ -985,7 +985,7 @@
           <a:p>
             <a:fld id="{1951D928-8AAE-F545-87DE-A0C9E2AF6744}" type="datetimeFigureOut">
               <a:rPr lang="en-US" smtClean="0"/>
-              <a:t>5/9/17</a:t>
+              <a:t>5/12/17</a:t>
             </a:fld>
             <a:endParaRPr lang="en-US"/>
           </a:p>
@@ -1094,8 +1094,8 @@
   <p:clrMapOvr>
     <a:masterClrMapping/>
   </p:clrMapOvr>
-  <mc:AlternateContent xmlns:mc="http://schemas.openxmlformats.org/markup-compatibility/2006">
-    <mc:Choice xmlns:p14="http://schemas.microsoft.com/office/powerpoint/2010/main" Requires="p14">
+  <mc:AlternateContent xmlns:mc="http://schemas.openxmlformats.org/markup-compatibility/2006" xmlns:p14="http://schemas.microsoft.com/office/powerpoint/2010/main">
+    <mc:Choice Requires="p14">
       <p:transition spd="slow" p14:dur="4000">
         <p14:vortex dir="r"/>
         <p:sndAc>
@@ -1105,12 +1105,12 @@
         </p:sndAc>
       </p:transition>
     </mc:Choice>
-    <mc:Fallback>
+    <mc:Fallback xmlns="">
       <p:transition spd="slow">
         <p:fade/>
         <p:sndAc>
           <p:stSnd>
-            <p:snd r:embed="rId1" name="Arrow.wav"/>
+            <p:snd r:embed="rId4" name="Arrow.wav"/>
           </p:stSnd>
         </p:sndAc>
       </p:transition>
@@ -2090,7 +2090,7 @@
           <a:p>
             <a:fld id="{1951D928-8AAE-F545-87DE-A0C9E2AF6744}" type="datetimeFigureOut">
               <a:rPr lang="en-US" smtClean="0"/>
-              <a:t>5/9/17</a:t>
+              <a:t>5/12/17</a:t>
             </a:fld>
             <a:endParaRPr lang="en-US"/>
           </a:p>
@@ -2179,8 +2179,8 @@
   <p:clrMapOvr>
     <a:masterClrMapping/>
   </p:clrMapOvr>
-  <mc:AlternateContent xmlns:mc="http://schemas.openxmlformats.org/markup-compatibility/2006">
-    <mc:Choice xmlns:p14="http://schemas.microsoft.com/office/powerpoint/2010/main" Requires="p14">
+  <mc:AlternateContent xmlns:mc="http://schemas.openxmlformats.org/markup-compatibility/2006" xmlns:p14="http://schemas.microsoft.com/office/powerpoint/2010/main">
+    <mc:Choice Requires="p14">
       <p:transition spd="slow" p14:dur="4000">
         <p14:vortex dir="r"/>
         <p:sndAc>
@@ -2190,12 +2190,12 @@
         </p:sndAc>
       </p:transition>
     </mc:Choice>
-    <mc:Fallback>
+    <mc:Fallback xmlns="">
       <p:transition spd="slow">
         <p:fade/>
         <p:sndAc>
           <p:stSnd>
-            <p:snd r:embed="rId1" name="Arrow.wav"/>
+            <p:snd r:embed="rId4" name="Arrow.wav"/>
           </p:stSnd>
         </p:sndAc>
       </p:transition>
@@ -3087,7 +3087,7 @@
           <a:p>
             <a:fld id="{1951D928-8AAE-F545-87DE-A0C9E2AF6744}" type="datetimeFigureOut">
               <a:rPr lang="en-US" smtClean="0"/>
-              <a:t>5/9/17</a:t>
+              <a:t>5/12/17</a:t>
             </a:fld>
             <a:endParaRPr lang="en-US"/>
           </a:p>
@@ -3176,8 +3176,8 @@
   <p:clrMapOvr>
     <a:masterClrMapping/>
   </p:clrMapOvr>
-  <mc:AlternateContent xmlns:mc="http://schemas.openxmlformats.org/markup-compatibility/2006">
-    <mc:Choice xmlns:p14="http://schemas.microsoft.com/office/powerpoint/2010/main" Requires="p14">
+  <mc:AlternateContent xmlns:mc="http://schemas.openxmlformats.org/markup-compatibility/2006" xmlns:p14="http://schemas.microsoft.com/office/powerpoint/2010/main">
+    <mc:Choice Requires="p14">
       <p:transition spd="slow" p14:dur="4000">
         <p14:vortex dir="r"/>
         <p:sndAc>
@@ -3187,12 +3187,12 @@
         </p:sndAc>
       </p:transition>
     </mc:Choice>
-    <mc:Fallback>
+    <mc:Fallback xmlns="">
       <p:transition spd="slow">
         <p:fade/>
         <p:sndAc>
           <p:stSnd>
-            <p:snd r:embed="rId1" name="Arrow.wav"/>
+            <p:snd r:embed="rId4" name="Arrow.wav"/>
           </p:stSnd>
         </p:sndAc>
       </p:transition>
@@ -4238,7 +4238,7 @@
           <a:p>
             <a:fld id="{1951D928-8AAE-F545-87DE-A0C9E2AF6744}" type="datetimeFigureOut">
               <a:rPr lang="en-US" smtClean="0"/>
-              <a:t>5/9/17</a:t>
+              <a:t>5/12/17</a:t>
             </a:fld>
             <a:endParaRPr lang="en-US"/>
           </a:p>
@@ -4327,8 +4327,8 @@
   <p:clrMapOvr>
     <a:masterClrMapping/>
   </p:clrMapOvr>
-  <mc:AlternateContent xmlns:mc="http://schemas.openxmlformats.org/markup-compatibility/2006">
-    <mc:Choice xmlns:p14="http://schemas.microsoft.com/office/powerpoint/2010/main" Requires="p14">
+  <mc:AlternateContent xmlns:mc="http://schemas.openxmlformats.org/markup-compatibility/2006" xmlns:p14="http://schemas.microsoft.com/office/powerpoint/2010/main">
+    <mc:Choice Requires="p14">
       <p:transition spd="slow" p14:dur="4000">
         <p14:vortex dir="r"/>
         <p:sndAc>
@@ -4338,12 +4338,12 @@
         </p:sndAc>
       </p:transition>
     </mc:Choice>
-    <mc:Fallback>
+    <mc:Fallback xmlns="">
       <p:transition spd="slow">
         <p:fade/>
         <p:sndAc>
           <p:stSnd>
-            <p:snd r:embed="rId1" name="Arrow.wav"/>
+            <p:snd r:embed="rId4" name="Arrow.wav"/>
           </p:stSnd>
         </p:sndAc>
       </p:transition>
@@ -5288,7 +5288,7 @@
           <a:p>
             <a:fld id="{1951D928-8AAE-F545-87DE-A0C9E2AF6744}" type="datetimeFigureOut">
               <a:rPr lang="en-US" smtClean="0"/>
-              <a:t>5/9/17</a:t>
+              <a:t>5/12/17</a:t>
             </a:fld>
             <a:endParaRPr lang="en-US"/>
           </a:p>
@@ -5377,8 +5377,8 @@
   <p:clrMapOvr>
     <a:masterClrMapping/>
   </p:clrMapOvr>
-  <mc:AlternateContent xmlns:mc="http://schemas.openxmlformats.org/markup-compatibility/2006">
-    <mc:Choice xmlns:p14="http://schemas.microsoft.com/office/powerpoint/2010/main" Requires="p14">
+  <mc:AlternateContent xmlns:mc="http://schemas.openxmlformats.org/markup-compatibility/2006" xmlns:p14="http://schemas.microsoft.com/office/powerpoint/2010/main">
+    <mc:Choice Requires="p14">
       <p:transition spd="slow" p14:dur="4000">
         <p14:vortex dir="r"/>
         <p:sndAc>
@@ -5388,12 +5388,12 @@
         </p:sndAc>
       </p:transition>
     </mc:Choice>
-    <mc:Fallback>
+    <mc:Fallback xmlns="">
       <p:transition spd="slow">
         <p:fade/>
         <p:sndAc>
           <p:stSnd>
-            <p:snd r:embed="rId1" name="Arrow.wav"/>
+            <p:snd r:embed="rId4" name="Arrow.wav"/>
           </p:stSnd>
         </p:sndAc>
       </p:transition>
@@ -5965,7 +5965,7 @@
           <a:p>
             <a:fld id="{1951D928-8AAE-F545-87DE-A0C9E2AF6744}" type="datetimeFigureOut">
               <a:rPr lang="en-US" smtClean="0"/>
-              <a:t>5/9/17</a:t>
+              <a:t>5/12/17</a:t>
             </a:fld>
             <a:endParaRPr lang="en-US"/>
           </a:p>
@@ -6018,8 +6018,8 @@
   <p:clrMapOvr>
     <a:masterClrMapping/>
   </p:clrMapOvr>
-  <mc:AlternateContent xmlns:mc="http://schemas.openxmlformats.org/markup-compatibility/2006">
-    <mc:Choice xmlns:p14="http://schemas.microsoft.com/office/powerpoint/2010/main" Requires="p14">
+  <mc:AlternateContent xmlns:mc="http://schemas.openxmlformats.org/markup-compatibility/2006" xmlns:p14="http://schemas.microsoft.com/office/powerpoint/2010/main">
+    <mc:Choice Requires="p14">
       <p:transition spd="slow" p14:dur="4000">
         <p14:vortex dir="r"/>
         <p:sndAc>
@@ -6029,12 +6029,12 @@
         </p:sndAc>
       </p:transition>
     </mc:Choice>
-    <mc:Fallback>
+    <mc:Fallback xmlns="">
       <p:transition spd="slow">
         <p:fade/>
         <p:sndAc>
           <p:stSnd>
-            <p:snd r:embed="rId1" name="Arrow.wav"/>
+            <p:snd r:embed="rId3" name="Arrow.wav"/>
           </p:stSnd>
         </p:sndAc>
       </p:transition>
@@ -6843,7 +6843,7 @@
           <a:p>
             <a:fld id="{1951D928-8AAE-F545-87DE-A0C9E2AF6744}" type="datetimeFigureOut">
               <a:rPr lang="en-US" smtClean="0"/>
-              <a:t>5/9/17</a:t>
+              <a:t>5/12/17</a:t>
             </a:fld>
             <a:endParaRPr lang="en-US"/>
           </a:p>
@@ -6901,8 +6901,8 @@
   <p:clrMapOvr>
     <a:masterClrMapping/>
   </p:clrMapOvr>
-  <mc:AlternateContent xmlns:mc="http://schemas.openxmlformats.org/markup-compatibility/2006">
-    <mc:Choice xmlns:p14="http://schemas.microsoft.com/office/powerpoint/2010/main" Requires="p14">
+  <mc:AlternateContent xmlns:mc="http://schemas.openxmlformats.org/markup-compatibility/2006" xmlns:p14="http://schemas.microsoft.com/office/powerpoint/2010/main">
+    <mc:Choice Requires="p14">
       <p:transition spd="slow" p14:dur="4000">
         <p14:vortex dir="r"/>
         <p:sndAc>
@@ -6912,12 +6912,12 @@
         </p:sndAc>
       </p:transition>
     </mc:Choice>
-    <mc:Fallback>
+    <mc:Fallback xmlns="">
       <p:transition spd="slow">
         <p:fade/>
         <p:sndAc>
           <p:stSnd>
-            <p:snd r:embed="rId1" name="Arrow.wav"/>
+            <p:snd r:embed="rId3" name="Arrow.wav"/>
           </p:stSnd>
         </p:sndAc>
       </p:transition>
@@ -7050,7 +7050,7 @@
           <a:p>
             <a:fld id="{1951D928-8AAE-F545-87DE-A0C9E2AF6744}" type="datetimeFigureOut">
               <a:rPr lang="en-US" smtClean="0"/>
-              <a:t>5/9/17</a:t>
+              <a:t>5/12/17</a:t>
             </a:fld>
             <a:endParaRPr lang="en-US"/>
           </a:p>
@@ -7103,8 +7103,8 @@
   <p:clrMapOvr>
     <a:masterClrMapping/>
   </p:clrMapOvr>
-  <mc:AlternateContent xmlns:mc="http://schemas.openxmlformats.org/markup-compatibility/2006">
-    <mc:Choice xmlns:p14="http://schemas.microsoft.com/office/powerpoint/2010/main" Requires="p14">
+  <mc:AlternateContent xmlns:mc="http://schemas.openxmlformats.org/markup-compatibility/2006" xmlns:p14="http://schemas.microsoft.com/office/powerpoint/2010/main">
+    <mc:Choice Requires="p14">
       <p:transition spd="slow" p14:dur="4000">
         <p14:vortex dir="r"/>
         <p:sndAc>
@@ -7114,12 +7114,12 @@
         </p:sndAc>
       </p:transition>
     </mc:Choice>
-    <mc:Fallback>
+    <mc:Fallback xmlns="">
       <p:transition spd="slow">
         <p:fade/>
         <p:sndAc>
           <p:stSnd>
-            <p:snd r:embed="rId1" name="Arrow.wav"/>
+            <p:snd r:embed="rId3" name="Arrow.wav"/>
           </p:stSnd>
         </p:sndAc>
       </p:transition>
@@ -8039,7 +8039,7 @@
           <a:p>
             <a:fld id="{1951D928-8AAE-F545-87DE-A0C9E2AF6744}" type="datetimeFigureOut">
               <a:rPr lang="en-US" smtClean="0"/>
-              <a:t>5/9/17</a:t>
+              <a:t>5/12/17</a:t>
             </a:fld>
             <a:endParaRPr lang="en-US"/>
           </a:p>
@@ -8128,8 +8128,8 @@
   <p:clrMapOvr>
     <a:masterClrMapping/>
   </p:clrMapOvr>
-  <mc:AlternateContent xmlns:mc="http://schemas.openxmlformats.org/markup-compatibility/2006">
-    <mc:Choice xmlns:p14="http://schemas.microsoft.com/office/powerpoint/2010/main" Requires="p14">
+  <mc:AlternateContent xmlns:mc="http://schemas.openxmlformats.org/markup-compatibility/2006" xmlns:p14="http://schemas.microsoft.com/office/powerpoint/2010/main">
+    <mc:Choice Requires="p14">
       <p:transition spd="slow" p14:dur="4000">
         <p14:vortex dir="r"/>
         <p:sndAc>
@@ -8139,12 +8139,12 @@
         </p:sndAc>
       </p:transition>
     </mc:Choice>
-    <mc:Fallback>
+    <mc:Fallback xmlns="">
       <p:transition spd="slow">
         <p:fade/>
         <p:sndAc>
           <p:stSnd>
-            <p:snd r:embed="rId1" name="Arrow.wav"/>
+            <p:snd r:embed="rId4" name="Arrow.wav"/>
           </p:stSnd>
         </p:sndAc>
       </p:transition>
@@ -8267,7 +8267,7 @@
           <a:p>
             <a:fld id="{1951D928-8AAE-F545-87DE-A0C9E2AF6744}" type="datetimeFigureOut">
               <a:rPr lang="en-US" smtClean="0"/>
-              <a:t>5/9/17</a:t>
+              <a:t>5/12/17</a:t>
             </a:fld>
             <a:endParaRPr lang="en-US"/>
           </a:p>
@@ -8320,8 +8320,8 @@
   <p:clrMapOvr>
     <a:masterClrMapping/>
   </p:clrMapOvr>
-  <mc:AlternateContent xmlns:mc="http://schemas.openxmlformats.org/markup-compatibility/2006">
-    <mc:Choice xmlns:p14="http://schemas.microsoft.com/office/powerpoint/2010/main" Requires="p14">
+  <mc:AlternateContent xmlns:mc="http://schemas.openxmlformats.org/markup-compatibility/2006" xmlns:p14="http://schemas.microsoft.com/office/powerpoint/2010/main">
+    <mc:Choice Requires="p14">
       <p:transition spd="slow" p14:dur="4000">
         <p14:vortex dir="r"/>
         <p:sndAc>
@@ -8331,12 +8331,12 @@
         </p:sndAc>
       </p:transition>
     </mc:Choice>
-    <mc:Fallback>
+    <mc:Fallback xmlns="">
       <p:transition spd="slow">
         <p:fade/>
         <p:sndAc>
           <p:stSnd>
-            <p:snd r:embed="rId1" name="Arrow.wav"/>
+            <p:snd r:embed="rId3" name="Arrow.wav"/>
           </p:stSnd>
         </p:sndAc>
       </p:transition>
@@ -9318,7 +9318,7 @@
           <a:p>
             <a:fld id="{1951D928-8AAE-F545-87DE-A0C9E2AF6744}" type="datetimeFigureOut">
               <a:rPr lang="en-US" smtClean="0"/>
-              <a:t>5/9/17</a:t>
+              <a:t>5/12/17</a:t>
             </a:fld>
             <a:endParaRPr lang="en-US"/>
           </a:p>
@@ -9407,8 +9407,8 @@
   <p:clrMapOvr>
     <a:masterClrMapping/>
   </p:clrMapOvr>
-  <mc:AlternateContent xmlns:mc="http://schemas.openxmlformats.org/markup-compatibility/2006">
-    <mc:Choice xmlns:p14="http://schemas.microsoft.com/office/powerpoint/2010/main" Requires="p14">
+  <mc:AlternateContent xmlns:mc="http://schemas.openxmlformats.org/markup-compatibility/2006" xmlns:p14="http://schemas.microsoft.com/office/powerpoint/2010/main">
+    <mc:Choice Requires="p14">
       <p:transition spd="slow" p14:dur="4000">
         <p14:vortex dir="r"/>
         <p:sndAc>
@@ -9418,12 +9418,12 @@
         </p:sndAc>
       </p:transition>
     </mc:Choice>
-    <mc:Fallback>
+    <mc:Fallback xmlns="">
       <p:transition spd="slow">
         <p:fade/>
         <p:sndAc>
           <p:stSnd>
-            <p:snd r:embed="rId1" name="Arrow.wav"/>
+            <p:snd r:embed="rId4" name="Arrow.wav"/>
           </p:stSnd>
         </p:sndAc>
       </p:transition>
@@ -9607,7 +9607,7 @@
           <a:p>
             <a:fld id="{1951D928-8AAE-F545-87DE-A0C9E2AF6744}" type="datetimeFigureOut">
               <a:rPr lang="en-US" smtClean="0"/>
-              <a:t>5/9/17</a:t>
+              <a:t>5/12/17</a:t>
             </a:fld>
             <a:endParaRPr lang="en-US"/>
           </a:p>
@@ -9660,8 +9660,8 @@
   <p:clrMapOvr>
     <a:masterClrMapping/>
   </p:clrMapOvr>
-  <mc:AlternateContent xmlns:mc="http://schemas.openxmlformats.org/markup-compatibility/2006">
-    <mc:Choice xmlns:p14="http://schemas.microsoft.com/office/powerpoint/2010/main" Requires="p14">
+  <mc:AlternateContent xmlns:mc="http://schemas.openxmlformats.org/markup-compatibility/2006" xmlns:p14="http://schemas.microsoft.com/office/powerpoint/2010/main">
+    <mc:Choice Requires="p14">
       <p:transition spd="slow" p14:dur="4000">
         <p14:vortex dir="r"/>
         <p:sndAc>
@@ -9671,12 +9671,12 @@
         </p:sndAc>
       </p:transition>
     </mc:Choice>
-    <mc:Fallback>
+    <mc:Fallback xmlns="">
       <p:transition spd="slow">
         <p:fade/>
         <p:sndAc>
           <p:stSnd>
-            <p:snd r:embed="rId1" name="Arrow.wav"/>
+            <p:snd r:embed="rId3" name="Arrow.wav"/>
           </p:stSnd>
         </p:sndAc>
       </p:transition>
@@ -10034,7 +10034,7 @@
           <a:p>
             <a:fld id="{1951D928-8AAE-F545-87DE-A0C9E2AF6744}" type="datetimeFigureOut">
               <a:rPr lang="en-US" smtClean="0"/>
-              <a:t>5/9/17</a:t>
+              <a:t>5/12/17</a:t>
             </a:fld>
             <a:endParaRPr lang="en-US"/>
           </a:p>
@@ -10087,8 +10087,8 @@
   <p:clrMapOvr>
     <a:masterClrMapping/>
   </p:clrMapOvr>
-  <mc:AlternateContent xmlns:mc="http://schemas.openxmlformats.org/markup-compatibility/2006">
-    <mc:Choice xmlns:p14="http://schemas.microsoft.com/office/powerpoint/2010/main" Requires="p14">
+  <mc:AlternateContent xmlns:mc="http://schemas.openxmlformats.org/markup-compatibility/2006" xmlns:p14="http://schemas.microsoft.com/office/powerpoint/2010/main">
+    <mc:Choice Requires="p14">
       <p:transition spd="slow" p14:dur="4000">
         <p14:vortex dir="r"/>
         <p:sndAc>
@@ -10098,12 +10098,12 @@
         </p:sndAc>
       </p:transition>
     </mc:Choice>
-    <mc:Fallback>
+    <mc:Fallback xmlns="">
       <p:transition spd="slow">
         <p:fade/>
         <p:sndAc>
           <p:stSnd>
-            <p:snd r:embed="rId1" name="Arrow.wav"/>
+            <p:snd r:embed="rId3" name="Arrow.wav"/>
           </p:stSnd>
         </p:sndAc>
       </p:transition>
@@ -10178,7 +10178,7 @@
           <a:p>
             <a:fld id="{1951D928-8AAE-F545-87DE-A0C9E2AF6744}" type="datetimeFigureOut">
               <a:rPr lang="en-US" smtClean="0"/>
-              <a:t>5/9/17</a:t>
+              <a:t>5/12/17</a:t>
             </a:fld>
             <a:endParaRPr lang="en-US"/>
           </a:p>
@@ -10231,8 +10231,8 @@
   <p:clrMapOvr>
     <a:masterClrMapping/>
   </p:clrMapOvr>
-  <mc:AlternateContent xmlns:mc="http://schemas.openxmlformats.org/markup-compatibility/2006">
-    <mc:Choice xmlns:p14="http://schemas.microsoft.com/office/powerpoint/2010/main" Requires="p14">
+  <mc:AlternateContent xmlns:mc="http://schemas.openxmlformats.org/markup-compatibility/2006" xmlns:p14="http://schemas.microsoft.com/office/powerpoint/2010/main">
+    <mc:Choice Requires="p14">
       <p:transition spd="slow" p14:dur="4000">
         <p14:vortex dir="r"/>
         <p:sndAc>
@@ -10242,12 +10242,12 @@
         </p:sndAc>
       </p:transition>
     </mc:Choice>
-    <mc:Fallback>
+    <mc:Fallback xmlns="">
       <p:transition spd="slow">
         <p:fade/>
         <p:sndAc>
           <p:stSnd>
-            <p:snd r:embed="rId1" name="Arrow.wav"/>
+            <p:snd r:embed="rId3" name="Arrow.wav"/>
           </p:stSnd>
         </p:sndAc>
       </p:transition>
@@ -10290,7 +10290,7 @@
           <a:p>
             <a:fld id="{1951D928-8AAE-F545-87DE-A0C9E2AF6744}" type="datetimeFigureOut">
               <a:rPr lang="en-US" smtClean="0"/>
-              <a:t>5/9/17</a:t>
+              <a:t>5/12/17</a:t>
             </a:fld>
             <a:endParaRPr lang="en-US"/>
           </a:p>
@@ -10379,8 +10379,8 @@
   <p:clrMapOvr>
     <a:masterClrMapping/>
   </p:clrMapOvr>
-  <mc:AlternateContent xmlns:mc="http://schemas.openxmlformats.org/markup-compatibility/2006">
-    <mc:Choice xmlns:p14="http://schemas.microsoft.com/office/powerpoint/2010/main" Requires="p14">
+  <mc:AlternateContent xmlns:mc="http://schemas.openxmlformats.org/markup-compatibility/2006" xmlns:p14="http://schemas.microsoft.com/office/powerpoint/2010/main">
+    <mc:Choice Requires="p14">
       <p:transition spd="slow" p14:dur="4000">
         <p14:vortex dir="r"/>
         <p:sndAc>
@@ -10390,12 +10390,12 @@
         </p:sndAc>
       </p:transition>
     </mc:Choice>
-    <mc:Fallback>
+    <mc:Fallback xmlns="">
       <p:transition spd="slow">
         <p:fade/>
         <p:sndAc>
           <p:stSnd>
-            <p:snd r:embed="rId1" name="Arrow.wav"/>
+            <p:snd r:embed="rId3" name="Arrow.wav"/>
           </p:stSnd>
         </p:sndAc>
       </p:transition>
@@ -11388,7 +11388,7 @@
           <a:p>
             <a:fld id="{1951D928-8AAE-F545-87DE-A0C9E2AF6744}" type="datetimeFigureOut">
               <a:rPr lang="en-US" smtClean="0"/>
-              <a:t>5/9/17</a:t>
+              <a:t>5/12/17</a:t>
             </a:fld>
             <a:endParaRPr lang="en-US"/>
           </a:p>
@@ -11477,8 +11477,8 @@
   <p:clrMapOvr>
     <a:masterClrMapping/>
   </p:clrMapOvr>
-  <mc:AlternateContent xmlns:mc="http://schemas.openxmlformats.org/markup-compatibility/2006">
-    <mc:Choice xmlns:p14="http://schemas.microsoft.com/office/powerpoint/2010/main" Requires="p14">
+  <mc:AlternateContent xmlns:mc="http://schemas.openxmlformats.org/markup-compatibility/2006" xmlns:p14="http://schemas.microsoft.com/office/powerpoint/2010/main">
+    <mc:Choice Requires="p14">
       <p:transition spd="slow" p14:dur="4000">
         <p14:vortex dir="r"/>
         <p:sndAc>
@@ -11488,12 +11488,12 @@
         </p:sndAc>
       </p:transition>
     </mc:Choice>
-    <mc:Fallback>
+    <mc:Fallback xmlns="">
       <p:transition spd="slow">
         <p:fade/>
         <p:sndAc>
           <p:stSnd>
-            <p:snd r:embed="rId1" name="Arrow.wav"/>
+            <p:snd r:embed="rId4" name="Arrow.wav"/>
           </p:stSnd>
         </p:sndAc>
       </p:transition>
@@ -12513,7 +12513,7 @@
           <a:p>
             <a:fld id="{1951D928-8AAE-F545-87DE-A0C9E2AF6744}" type="datetimeFigureOut">
               <a:rPr lang="en-US" smtClean="0"/>
-              <a:t>5/9/17</a:t>
+              <a:t>5/12/17</a:t>
             </a:fld>
             <a:endParaRPr lang="en-US"/>
           </a:p>
@@ -12602,8 +12602,8 @@
   <p:clrMapOvr>
     <a:masterClrMapping/>
   </p:clrMapOvr>
-  <mc:AlternateContent xmlns:mc="http://schemas.openxmlformats.org/markup-compatibility/2006">
-    <mc:Choice xmlns:p14="http://schemas.microsoft.com/office/powerpoint/2010/main" Requires="p14">
+  <mc:AlternateContent xmlns:mc="http://schemas.openxmlformats.org/markup-compatibility/2006" xmlns:p14="http://schemas.microsoft.com/office/powerpoint/2010/main">
+    <mc:Choice Requires="p14">
       <p:transition spd="slow" p14:dur="4000">
         <p14:vortex dir="r"/>
         <p:sndAc>
@@ -12613,12 +12613,12 @@
         </p:sndAc>
       </p:transition>
     </mc:Choice>
-    <mc:Fallback>
+    <mc:Fallback xmlns="">
       <p:transition spd="slow">
         <p:fade/>
         <p:sndAc>
           <p:stSnd>
-            <p:snd r:embed="rId1" name="Arrow.wav"/>
+            <p:snd r:embed="rId4" name="Arrow.wav"/>
           </p:stSnd>
         </p:sndAc>
       </p:transition>
@@ -13527,7 +13527,7 @@
           <a:p>
             <a:fld id="{1951D928-8AAE-F545-87DE-A0C9E2AF6744}" type="datetimeFigureOut">
               <a:rPr lang="en-US" smtClean="0"/>
-              <a:t>5/9/17</a:t>
+              <a:t>5/12/17</a:t>
             </a:fld>
             <a:endParaRPr lang="en-US"/>
           </a:p>
@@ -13670,8 +13670,8 @@
     <p:sldLayoutId id="2147483694" r:id="rId16"/>
     <p:sldLayoutId id="2147483695" r:id="rId17"/>
   </p:sldLayoutIdLst>
-  <mc:AlternateContent xmlns:mc="http://schemas.openxmlformats.org/markup-compatibility/2006">
-    <mc:Choice xmlns:p14="http://schemas.microsoft.com/office/powerpoint/2010/main" Requires="p14">
+  <mc:AlternateContent xmlns:mc="http://schemas.openxmlformats.org/markup-compatibility/2006" xmlns:p14="http://schemas.microsoft.com/office/powerpoint/2010/main">
+    <mc:Choice Requires="p14">
       <p:transition spd="slow" p14:dur="4000">
         <p14:vortex dir="r"/>
         <p:sndAc>
@@ -13681,12 +13681,12 @@
         </p:sndAc>
       </p:transition>
     </mc:Choice>
-    <mc:Fallback>
+    <mc:Fallback xmlns="">
       <p:transition spd="slow">
         <p:fade/>
         <p:sndAc>
           <p:stSnd>
-            <p:snd r:embed="rId19" name="Arrow.wav"/>
+            <p:snd r:embed="rId21" name="Arrow.wav"/>
           </p:stSnd>
         </p:sndAc>
       </p:transition>
@@ -14148,11 +14148,7 @@
           <a:p>
             <a:r>
               <a:rPr lang="en-US" dirty="0" smtClean="0"/>
-              <a:t>With</a:t>
-            </a:r>
-            <a:r>
-              <a:rPr lang="en-US" dirty="0" smtClean="0"/>
-              <a:t> </a:t>
+              <a:t>With </a:t>
             </a:r>
             <a:r>
               <a:rPr lang="en-US" dirty="0" err="1" smtClean="0"/>
@@ -14175,8 +14171,8 @@
   <p:clrMapOvr>
     <a:masterClrMapping/>
   </p:clrMapOvr>
-  <mc:AlternateContent xmlns:mc="http://schemas.openxmlformats.org/markup-compatibility/2006">
-    <mc:Choice xmlns:p14="http://schemas.microsoft.com/office/powerpoint/2010/main" Requires="p14">
+  <mc:AlternateContent xmlns:mc="http://schemas.openxmlformats.org/markup-compatibility/2006" xmlns:p14="http://schemas.microsoft.com/office/powerpoint/2010/main">
+    <mc:Choice Requires="p14">
       <p:transition spd="slow" p14:dur="4000">
         <p14:vortex dir="r"/>
         <p:sndAc>
@@ -14186,12 +14182,12 @@
         </p:sndAc>
       </p:transition>
     </mc:Choice>
-    <mc:Fallback>
+    <mc:Fallback xmlns="">
       <p:transition spd="slow">
         <p:fade/>
         <p:sndAc>
           <p:stSnd>
-            <p:snd r:embed="rId2" name="Arrow.wav"/>
+            <p:snd r:embed="rId3" name="Arrow.wav"/>
           </p:stSnd>
         </p:sndAc>
       </p:transition>
@@ -14402,8 +14398,8 @@
   <p:clrMapOvr>
     <a:masterClrMapping/>
   </p:clrMapOvr>
-  <mc:AlternateContent xmlns:mc="http://schemas.openxmlformats.org/markup-compatibility/2006">
-    <mc:Choice xmlns:p14="http://schemas.microsoft.com/office/powerpoint/2010/main" Requires="p14">
+  <mc:AlternateContent xmlns:mc="http://schemas.openxmlformats.org/markup-compatibility/2006" xmlns:p14="http://schemas.microsoft.com/office/powerpoint/2010/main">
+    <mc:Choice Requires="p14">
       <p:transition spd="slow" p14:dur="4000">
         <p14:vortex dir="r"/>
         <p:sndAc>
@@ -14413,12 +14409,12 @@
         </p:sndAc>
       </p:transition>
     </mc:Choice>
-    <mc:Fallback>
+    <mc:Fallback xmlns="">
       <p:transition spd="slow">
         <p:fade/>
         <p:sndAc>
           <p:stSnd>
-            <p:snd r:embed="rId2" name="Arrow.wav"/>
+            <p:snd r:embed="rId6" name="Arrow.wav"/>
           </p:stSnd>
         </p:sndAc>
       </p:transition>
@@ -14461,11 +14457,7 @@
           <a:p>
             <a:r>
               <a:rPr lang="en-US" dirty="0" smtClean="0"/>
-              <a:t>What </a:t>
-            </a:r>
-            <a:r>
-              <a:rPr lang="en-US" dirty="0" smtClean="0"/>
-              <a:t>is C++?</a:t>
+              <a:t>What is C++?</a:t>
             </a:r>
             <a:endParaRPr lang="en-US" dirty="0"/>
           </a:p>
@@ -14628,8 +14620,8 @@
   <p:clrMapOvr>
     <a:masterClrMapping/>
   </p:clrMapOvr>
-  <mc:AlternateContent xmlns:mc="http://schemas.openxmlformats.org/markup-compatibility/2006">
-    <mc:Choice xmlns:p14="http://schemas.microsoft.com/office/powerpoint/2010/main" Requires="p14">
+  <mc:AlternateContent xmlns:mc="http://schemas.openxmlformats.org/markup-compatibility/2006" xmlns:p14="http://schemas.microsoft.com/office/powerpoint/2010/main">
+    <mc:Choice Requires="p14">
       <p:transition spd="slow" p14:dur="4000">
         <p14:vortex dir="r"/>
         <p:sndAc>
@@ -14639,12 +14631,12 @@
         </p:sndAc>
       </p:transition>
     </mc:Choice>
-    <mc:Fallback>
+    <mc:Fallback xmlns="">
       <p:transition spd="slow">
         <p:fade/>
         <p:sndAc>
           <p:stSnd>
-            <p:snd r:embed="rId3" name="Arrow.wav"/>
+            <p:snd r:embed="rId4" name="Arrow.wav"/>
           </p:stSnd>
         </p:sndAc>
       </p:transition>
@@ -14694,11 +14686,7 @@
           <a:p>
             <a:r>
               <a:rPr lang="en-US" dirty="0" smtClean="0"/>
-              <a:t>Why </a:t>
-            </a:r>
-            <a:r>
-              <a:rPr lang="en-US" dirty="0" smtClean="0"/>
-              <a:t>Should I Learn C++?</a:t>
+              <a:t>Why Should I Learn C++?</a:t>
             </a:r>
             <a:endParaRPr lang="en-US" dirty="0"/>
           </a:p>
@@ -14804,8 +14792,8 @@
   <p:clrMapOvr>
     <a:masterClrMapping/>
   </p:clrMapOvr>
-  <mc:AlternateContent xmlns:mc="http://schemas.openxmlformats.org/markup-compatibility/2006">
-    <mc:Choice xmlns:p14="http://schemas.microsoft.com/office/powerpoint/2010/main" Requires="p14">
+  <mc:AlternateContent xmlns:mc="http://schemas.openxmlformats.org/markup-compatibility/2006" xmlns:p14="http://schemas.microsoft.com/office/powerpoint/2010/main">
+    <mc:Choice Requires="p14">
       <p:transition spd="slow" p14:dur="4000">
         <p14:vortex dir="r"/>
         <p:sndAc>
@@ -14815,12 +14803,12 @@
         </p:sndAc>
       </p:transition>
     </mc:Choice>
-    <mc:Fallback>
+    <mc:Fallback xmlns="">
       <p:transition spd="slow">
         <p:fade/>
         <p:sndAc>
           <p:stSnd>
-            <p:snd r:embed="rId2" name="Arrow.wav"/>
+            <p:snd r:embed="rId3" name="Arrow.wav"/>
           </p:stSnd>
         </p:sndAc>
       </p:transition>
@@ -15064,8 +15052,8 @@
   <p:clrMapOvr>
     <a:masterClrMapping/>
   </p:clrMapOvr>
-  <mc:AlternateContent xmlns:mc="http://schemas.openxmlformats.org/markup-compatibility/2006">
-    <mc:Choice xmlns:p14="http://schemas.microsoft.com/office/powerpoint/2010/main" Requires="p14">
+  <mc:AlternateContent xmlns:mc="http://schemas.openxmlformats.org/markup-compatibility/2006" xmlns:p14="http://schemas.microsoft.com/office/powerpoint/2010/main">
+    <mc:Choice Requires="p14">
       <p:transition spd="slow" p14:dur="4000">
         <p14:vortex dir="r"/>
         <p:sndAc>
@@ -15075,12 +15063,12 @@
         </p:sndAc>
       </p:transition>
     </mc:Choice>
-    <mc:Fallback>
+    <mc:Fallback xmlns="">
       <p:transition spd="slow">
         <p:fade/>
         <p:sndAc>
           <p:stSnd>
-            <p:snd r:embed="rId2" name="Arrow.wav"/>
+            <p:snd r:embed="rId7" name="Arrow.wav"/>
           </p:stSnd>
         </p:sndAc>
       </p:transition>
@@ -15182,11 +15170,7 @@
           <a:p>
             <a:r>
               <a:rPr lang="en-US" dirty="0" smtClean="0"/>
-              <a:t>A </a:t>
-            </a:r>
-            <a:r>
-              <a:rPr lang="en-US" dirty="0" smtClean="0"/>
-              <a:t>function can also accept parameters:</a:t>
+              <a:t>A function can also accept parameters:</a:t>
             </a:r>
           </a:p>
           <a:p>
@@ -15278,11 +15262,7 @@
           <a:p>
             <a:r>
               <a:rPr lang="en-US" dirty="0" smtClean="0"/>
-              <a:t>In this function, the snake’s length is being subtracted by its starting length to calculate the player’s score. The result is returned back to the caller of the function</a:t>
-            </a:r>
-            <a:r>
-              <a:rPr lang="en-US" dirty="0" smtClean="0"/>
-              <a:t>.</a:t>
+              <a:t>In this function, the snake’s length is being subtracted by its starting length to calculate the player’s score. The result is returned back to the caller of the function.</a:t>
             </a:r>
           </a:p>
           <a:p>
@@ -15366,8 +15346,8 @@
   <p:clrMapOvr>
     <a:masterClrMapping/>
   </p:clrMapOvr>
-  <mc:AlternateContent xmlns:mc="http://schemas.openxmlformats.org/markup-compatibility/2006">
-    <mc:Choice xmlns:p14="http://schemas.microsoft.com/office/powerpoint/2010/main" Requires="p14">
+  <mc:AlternateContent xmlns:mc="http://schemas.openxmlformats.org/markup-compatibility/2006" xmlns:p14="http://schemas.microsoft.com/office/powerpoint/2010/main">
+    <mc:Choice Requires="p14">
       <p:transition spd="slow" p14:dur="4000">
         <p14:vortex dir="r"/>
         <p:sndAc>
@@ -15377,12 +15357,12 @@
         </p:sndAc>
       </p:transition>
     </mc:Choice>
-    <mc:Fallback>
+    <mc:Fallback xmlns="">
       <p:transition spd="slow">
         <p:fade/>
         <p:sndAc>
           <p:stSnd>
-            <p:snd r:embed="rId3" name="Arrow.wav"/>
+            <p:snd r:embed="rId8" name="Arrow.wav"/>
           </p:stSnd>
         </p:sndAc>
       </p:transition>
@@ -15506,8 +15486,8 @@
   <p:clrMapOvr>
     <a:masterClrMapping/>
   </p:clrMapOvr>
-  <mc:AlternateContent xmlns:mc="http://schemas.openxmlformats.org/markup-compatibility/2006">
-    <mc:Choice xmlns:p14="http://schemas.microsoft.com/office/powerpoint/2010/main" Requires="p14">
+  <mc:AlternateContent xmlns:mc="http://schemas.openxmlformats.org/markup-compatibility/2006" xmlns:p14="http://schemas.microsoft.com/office/powerpoint/2010/main">
+    <mc:Choice Requires="p14">
       <p:transition spd="slow" p14:dur="4000">
         <p14:vortex dir="r"/>
         <p:sndAc>
@@ -15517,12 +15497,12 @@
         </p:sndAc>
       </p:transition>
     </mc:Choice>
-    <mc:Fallback>
+    <mc:Fallback xmlns="">
       <p:transition spd="slow">
         <p:fade/>
         <p:sndAc>
           <p:stSnd>
-            <p:snd r:embed="rId2" name="Arrow.wav"/>
+            <p:snd r:embed="rId4" name="Arrow.wav"/>
           </p:stSnd>
         </p:sndAc>
       </p:transition>
@@ -15637,7 +15617,11 @@
           <a:p>
             <a:r>
               <a:rPr lang="en-US" dirty="0" smtClean="0"/>
-              <a:t>If you want to follow along, go to this URL on your laptop: </a:t>
+              <a:t>If you want to follow along, go to this URL on your </a:t>
+            </a:r>
+            <a:r>
+              <a:rPr lang="en-US" dirty="0" smtClean="0"/>
+              <a:t>laptop: </a:t>
             </a:r>
             <a:r>
               <a:rPr lang="en-US" dirty="0">
@@ -15656,8 +15640,41 @@
           <a:p>
             <a:r>
               <a:rPr lang="en-US" dirty="0" smtClean="0"/>
-              <a:t>Or if you’re feeling frisky, compile the code yourself! NOTE: this means you need a compiler!</a:t>
-            </a:r>
+              <a:t>Or if you’re </a:t>
+            </a:r>
+            <a:r>
+              <a:rPr lang="en-US" smtClean="0"/>
+              <a:t>feeling </a:t>
+            </a:r>
+            <a:r>
+              <a:rPr lang="en-US" smtClean="0"/>
+              <a:t>frisky</a:t>
+            </a:r>
+            <a:r>
+              <a:rPr lang="en-US" dirty="0" smtClean="0"/>
+              <a:t>, compile the code </a:t>
+            </a:r>
+            <a:r>
+              <a:rPr lang="en-US" dirty="0"/>
+              <a:t>yourself: </a:t>
+            </a:r>
+            <a:r>
+              <a:rPr lang="en-US" dirty="0">
+                <a:hlinkClick r:id="rId4"/>
+              </a:rPr>
+              <a:t>https://</a:t>
+            </a:r>
+            <a:r>
+              <a:rPr lang="en-US" dirty="0" smtClean="0">
+                <a:hlinkClick r:id="rId4"/>
+              </a:rPr>
+              <a:t>github.com/NoctisGames/IntroToCPlusPlusGameDev</a:t>
+            </a:r>
+            <a:r>
+              <a:rPr lang="en-US" dirty="0" smtClean="0"/>
+              <a:t> </a:t>
+            </a:r>
+            <a:endParaRPr lang="en-US" dirty="0" smtClean="0"/>
           </a:p>
           <a:p>
             <a:endParaRPr lang="en-US" dirty="0" smtClean="0"/>
@@ -15674,8 +15691,8 @@
   <p:clrMapOvr>
     <a:masterClrMapping/>
   </p:clrMapOvr>
-  <mc:AlternateContent xmlns:mc="http://schemas.openxmlformats.org/markup-compatibility/2006">
-    <mc:Choice xmlns:p14="http://schemas.microsoft.com/office/powerpoint/2010/main" Requires="p14">
+  <mc:AlternateContent xmlns:mc="http://schemas.openxmlformats.org/markup-compatibility/2006" xmlns:p14="http://schemas.microsoft.com/office/powerpoint/2010/main">
+    <mc:Choice Requires="p14">
       <p:transition spd="slow" p14:dur="4000">
         <p14:vortex dir="r"/>
         <p:sndAc>
@@ -15685,12 +15702,12 @@
         </p:sndAc>
       </p:transition>
     </mc:Choice>
-    <mc:Fallback>
+    <mc:Fallback xmlns="">
       <p:transition spd="slow">
         <p:fade/>
         <p:sndAc>
           <p:stSnd>
-            <p:snd r:embed="rId2" name="Arrow.wav"/>
+            <p:snd r:embed="rId5" name="Arrow.wav"/>
           </p:stSnd>
         </p:sndAc>
       </p:transition>
@@ -15774,11 +15791,7 @@
           <a:p>
             <a:r>
               <a:rPr lang="en-US" dirty="0" smtClean="0"/>
-              <a:t>Once </a:t>
-            </a:r>
-            <a:r>
-              <a:rPr lang="en-US" dirty="0" smtClean="0"/>
-              <a:t>you’re ready, here are a few </a:t>
+              <a:t>Once you’re ready, here are a few </a:t>
             </a:r>
             <a:r>
               <a:rPr lang="en-US" dirty="0"/>
@@ -15884,8 +15897,8 @@
   <p:clrMapOvr>
     <a:masterClrMapping/>
   </p:clrMapOvr>
-  <mc:AlternateContent xmlns:mc="http://schemas.openxmlformats.org/markup-compatibility/2006">
-    <mc:Choice xmlns:p14="http://schemas.microsoft.com/office/powerpoint/2010/main" Requires="p14">
+  <mc:AlternateContent xmlns:mc="http://schemas.openxmlformats.org/markup-compatibility/2006" xmlns:p14="http://schemas.microsoft.com/office/powerpoint/2010/main">
+    <mc:Choice Requires="p14">
       <p:transition spd="slow" p14:dur="4000">
         <p14:vortex dir="r"/>
         <p:sndAc>
@@ -15895,12 +15908,12 @@
         </p:sndAc>
       </p:transition>
     </mc:Choice>
-    <mc:Fallback>
+    <mc:Fallback xmlns="">
       <p:transition spd="slow">
         <p:fade/>
         <p:sndAc>
           <p:stSnd>
-            <p:snd r:embed="rId2" name="Arrow.wav"/>
+            <p:snd r:embed="rId3" name="Arrow.wav"/>
           </p:stSnd>
         </p:sndAc>
       </p:transition>
@@ -16006,8 +16019,8 @@
   <p:clrMapOvr>
     <a:masterClrMapping/>
   </p:clrMapOvr>
-  <mc:AlternateContent xmlns:mc="http://schemas.openxmlformats.org/markup-compatibility/2006">
-    <mc:Choice xmlns:p14="http://schemas.microsoft.com/office/powerpoint/2010/main" Requires="p14">
+  <mc:AlternateContent xmlns:mc="http://schemas.openxmlformats.org/markup-compatibility/2006" xmlns:p14="http://schemas.microsoft.com/office/powerpoint/2010/main">
+    <mc:Choice Requires="p14">
       <p:transition spd="slow" p14:dur="4000">
         <p14:vortex dir="r"/>
         <p:sndAc>
@@ -16017,12 +16030,12 @@
         </p:sndAc>
       </p:transition>
     </mc:Choice>
-    <mc:Fallback>
+    <mc:Fallback xmlns="">
       <p:transition spd="slow">
         <p:fade/>
         <p:sndAc>
           <p:stSnd>
-            <p:snd r:embed="rId2" name="Arrow.wav"/>
+            <p:snd r:embed="rId3" name="Arrow.wav"/>
           </p:stSnd>
         </p:sndAc>
       </p:transition>

</xml_diff>